<commit_message>
Fixed bug in being able to remove email with edit
</commit_message>
<xml_diff>
--- a/docs/diagrams/CommandSequenceDiagrams.pptx
+++ b/docs/diagrams/CommandSequenceDiagrams.pptx
@@ -5,12 +5,13 @@
     <p:sldMasterId id="2147483648" r:id="rId1"/>
   </p:sldMasterIdLst>
   <p:notesMasterIdLst>
-    <p:notesMasterId r:id="rId5"/>
+    <p:notesMasterId r:id="rId6"/>
   </p:notesMasterIdLst>
   <p:sldIdLst>
     <p:sldId id="266" r:id="rId2"/>
     <p:sldId id="267" r:id="rId3"/>
     <p:sldId id="268" r:id="rId4"/>
+    <p:sldId id="269" r:id="rId5"/>
   </p:sldIdLst>
   <p:sldSz cx="9144000" cy="6858000" type="screen4x3"/>
   <p:notesSz cx="6858000" cy="9144000"/>
@@ -111,7 +112,7 @@
   </p:defaultTextStyle>
   <p:extLst>
     <p:ext uri="{EFAFB233-063F-42B5-8137-9DF3F51BA10A}">
-      <p15:sldGuideLst xmlns:p15="http://schemas.microsoft.com/office/powerpoint/2012/main">
+      <p15:sldGuideLst xmlns:p15="http://schemas.microsoft.com/office/powerpoint/2012/main" xmlns="">
         <p15:guide id="1" orient="horz" pos="1488">
           <p15:clr>
             <a:srgbClr val="A4A3A4"/>
@@ -210,7 +211,7 @@
           <a:p>
             <a:fld id="{F5CC4B3F-88C1-4FFA-B1B6-F41C21DC6924}" type="datetimeFigureOut">
               <a:rPr lang="en-US" smtClean="0"/>
-              <a:t>11/8/2017</a:t>
+              <a:t>10/11/17</a:t>
             </a:fld>
             <a:endParaRPr lang="en-US"/>
           </a:p>
@@ -659,7 +660,7 @@
           <a:p>
             <a:fld id="{78C97017-6FC3-485B-9764-EAC9E56C1D49}" type="datetimeFigureOut">
               <a:rPr lang="en-US" smtClean="0"/>
-              <a:t>11/8/2017</a:t>
+              <a:t>10/11/17</a:t>
             </a:fld>
             <a:endParaRPr lang="en-US"/>
           </a:p>
@@ -829,7 +830,7 @@
           <a:p>
             <a:fld id="{78C97017-6FC3-485B-9764-EAC9E56C1D49}" type="datetimeFigureOut">
               <a:rPr lang="en-US" smtClean="0"/>
-              <a:t>11/8/2017</a:t>
+              <a:t>10/11/17</a:t>
             </a:fld>
             <a:endParaRPr lang="en-US"/>
           </a:p>
@@ -1009,7 +1010,7 @@
           <a:p>
             <a:fld id="{78C97017-6FC3-485B-9764-EAC9E56C1D49}" type="datetimeFigureOut">
               <a:rPr lang="en-US" smtClean="0"/>
-              <a:t>11/8/2017</a:t>
+              <a:t>10/11/17</a:t>
             </a:fld>
             <a:endParaRPr lang="en-US"/>
           </a:p>
@@ -1179,7 +1180,7 @@
           <a:p>
             <a:fld id="{78C97017-6FC3-485B-9764-EAC9E56C1D49}" type="datetimeFigureOut">
               <a:rPr lang="en-US" smtClean="0"/>
-              <a:t>11/8/2017</a:t>
+              <a:t>10/11/17</a:t>
             </a:fld>
             <a:endParaRPr lang="en-US"/>
           </a:p>
@@ -1425,7 +1426,7 @@
           <a:p>
             <a:fld id="{78C97017-6FC3-485B-9764-EAC9E56C1D49}" type="datetimeFigureOut">
               <a:rPr lang="en-US" smtClean="0"/>
-              <a:t>11/8/2017</a:t>
+              <a:t>10/11/17</a:t>
             </a:fld>
             <a:endParaRPr lang="en-US"/>
           </a:p>
@@ -1713,7 +1714,7 @@
           <a:p>
             <a:fld id="{78C97017-6FC3-485B-9764-EAC9E56C1D49}" type="datetimeFigureOut">
               <a:rPr lang="en-US" smtClean="0"/>
-              <a:t>11/8/2017</a:t>
+              <a:t>10/11/17</a:t>
             </a:fld>
             <a:endParaRPr lang="en-US"/>
           </a:p>
@@ -2135,7 +2136,7 @@
           <a:p>
             <a:fld id="{78C97017-6FC3-485B-9764-EAC9E56C1D49}" type="datetimeFigureOut">
               <a:rPr lang="en-US" smtClean="0"/>
-              <a:t>11/8/2017</a:t>
+              <a:t>10/11/17</a:t>
             </a:fld>
             <a:endParaRPr lang="en-US"/>
           </a:p>
@@ -2253,7 +2254,7 @@
           <a:p>
             <a:fld id="{78C97017-6FC3-485B-9764-EAC9E56C1D49}" type="datetimeFigureOut">
               <a:rPr lang="en-US" smtClean="0"/>
-              <a:t>11/8/2017</a:t>
+              <a:t>10/11/17</a:t>
             </a:fld>
             <a:endParaRPr lang="en-US"/>
           </a:p>
@@ -2348,7 +2349,7 @@
           <a:p>
             <a:fld id="{78C97017-6FC3-485B-9764-EAC9E56C1D49}" type="datetimeFigureOut">
               <a:rPr lang="en-US" smtClean="0"/>
-              <a:t>11/8/2017</a:t>
+              <a:t>10/11/17</a:t>
             </a:fld>
             <a:endParaRPr lang="en-US"/>
           </a:p>
@@ -2625,7 +2626,7 @@
           <a:p>
             <a:fld id="{78C97017-6FC3-485B-9764-EAC9E56C1D49}" type="datetimeFigureOut">
               <a:rPr lang="en-US" smtClean="0"/>
-              <a:t>11/8/2017</a:t>
+              <a:t>10/11/17</a:t>
             </a:fld>
             <a:endParaRPr lang="en-US"/>
           </a:p>
@@ -2878,7 +2879,7 @@
           <a:p>
             <a:fld id="{78C97017-6FC3-485B-9764-EAC9E56C1D49}" type="datetimeFigureOut">
               <a:rPr lang="en-US" smtClean="0"/>
-              <a:t>11/8/2017</a:t>
+              <a:t>10/11/17</a:t>
             </a:fld>
             <a:endParaRPr lang="en-US"/>
           </a:p>
@@ -3091,7 +3092,7 @@
           <a:p>
             <a:fld id="{78C97017-6FC3-485B-9764-EAC9E56C1D49}" type="datetimeFigureOut">
               <a:rPr lang="en-US" smtClean="0"/>
-              <a:t>11/8/2017</a:t>
+              <a:t>10/11/17</a:t>
             </a:fld>
             <a:endParaRPr lang="en-US"/>
           </a:p>
@@ -4147,27 +4148,7 @@
                   </a:schemeClr>
                 </a:solidFill>
               </a:rPr>
-              <a:t>Post</a:t>
-            </a:r>
-            <a:r>
-              <a:rPr lang="en-US" sz="1400" dirty="0" smtClean="0">
-                <a:solidFill>
-                  <a:schemeClr val="accent5">
-                    <a:lumMod val="75000"/>
-                  </a:schemeClr>
-                </a:solidFill>
-              </a:rPr>
-              <a:t>( ShowCalendarRequestEvent</a:t>
-            </a:r>
-            <a:r>
-              <a:rPr lang="en-US" sz="1400" dirty="0" smtClean="0">
-                <a:solidFill>
-                  <a:schemeClr val="accent5">
-                    <a:lumMod val="75000"/>
-                  </a:schemeClr>
-                </a:solidFill>
-              </a:rPr>
-              <a:t>)</a:t>
+              <a:t>Post( ShowCalendarRequestEvent)</a:t>
             </a:r>
             <a:endParaRPr lang="en-US" sz="1400" dirty="0">
               <a:solidFill>
@@ -4540,6 +4521,13 @@
   <p:clrMapOvr>
     <a:masterClrMapping/>
   </p:clrMapOvr>
+  <p:timing>
+    <p:tnLst>
+      <p:par>
+        <p:cTn xmlns:p14="http://schemas.microsoft.com/office/powerpoint/2010/main" id="1" dur="indefinite" restart="never" nodeType="tmRoot"/>
+      </p:par>
+    </p:tnLst>
+  </p:timing>
 </p:sld>
 </file>
 
@@ -5278,15 +5266,7 @@
           <a:p>
             <a:r>
               <a:rPr lang="en-US" sz="1400" dirty="0" smtClean="0"/>
-              <a:t>email</a:t>
-            </a:r>
-            <a:r>
-              <a:rPr lang="en-US" sz="1400" dirty="0" smtClean="0"/>
-              <a:t> </a:t>
-            </a:r>
-            <a:r>
-              <a:rPr lang="en-US" sz="1400" dirty="0" smtClean="0"/>
-              <a:t>1</a:t>
+              <a:t>email 1</a:t>
             </a:r>
             <a:endParaRPr lang="en-US" sz="1400" dirty="0"/>
           </a:p>
@@ -5356,23 +5336,7 @@
                   <a:srgbClr val="0070C0"/>
                 </a:solidFill>
               </a:rPr>
-              <a:t>execute</a:t>
-            </a:r>
-            <a:r>
-              <a:rPr lang="en-US" sz="1400" dirty="0" smtClean="0">
-                <a:solidFill>
-                  <a:srgbClr val="0070C0"/>
-                </a:solidFill>
-              </a:rPr>
-              <a:t>(“email </a:t>
-            </a:r>
-            <a:r>
-              <a:rPr lang="en-US" sz="1400" dirty="0" smtClean="0">
-                <a:solidFill>
-                  <a:srgbClr val="0070C0"/>
-                </a:solidFill>
-              </a:rPr>
-              <a:t>1”)</a:t>
+              <a:t>execute(“email 1”)</a:t>
             </a:r>
             <a:endParaRPr lang="en-US" sz="1400" dirty="0">
               <a:solidFill>
@@ -5787,6 +5751,13 @@
   <p:clrMapOvr>
     <a:masterClrMapping/>
   </p:clrMapOvr>
+  <p:timing>
+    <p:tnLst>
+      <p:par>
+        <p:cTn xmlns:p14="http://schemas.microsoft.com/office/powerpoint/2010/main" id="1" dur="indefinite" restart="never" nodeType="tmRoot"/>
+      </p:par>
+    </p:tnLst>
+  </p:timing>
 </p:sld>
 </file>
 
@@ -6525,11 +6496,7 @@
           <a:p>
             <a:r>
               <a:rPr lang="en-US" sz="1400" dirty="0" smtClean="0"/>
-              <a:t>Find n/Alice</a:t>
-            </a:r>
-            <a:r>
-              <a:rPr lang="en-US" sz="1400" dirty="0" smtClean="0"/>
-              <a:t> </a:t>
+              <a:t>Find n/Alice </a:t>
             </a:r>
             <a:endParaRPr lang="en-US" sz="1400" dirty="0"/>
           </a:p>
@@ -6599,15 +6566,7 @@
                   <a:srgbClr val="0070C0"/>
                 </a:solidFill>
               </a:rPr>
-              <a:t>execute</a:t>
-            </a:r>
-            <a:r>
-              <a:rPr lang="en-US" sz="1400" dirty="0" smtClean="0">
-                <a:solidFill>
-                  <a:srgbClr val="0070C0"/>
-                </a:solidFill>
-              </a:rPr>
-              <a:t>(“find n/Alice ”)</a:t>
+              <a:t>execute(“find n/Alice ”)</a:t>
             </a:r>
             <a:endParaRPr lang="en-US" sz="1400" dirty="0">
               <a:solidFill>
@@ -6852,6 +6811,1148 @@
   <p:clrMapOvr>
     <a:masterClrMapping/>
   </p:clrMapOvr>
+  <p:timing>
+    <p:tnLst>
+      <p:par>
+        <p:cTn xmlns:p14="http://schemas.microsoft.com/office/powerpoint/2010/main" id="1" dur="indefinite" restart="never" nodeType="tmRoot"/>
+      </p:par>
+    </p:tnLst>
+  </p:timing>
+</p:sld>
+</file>
+
+<file path=ppt/slides/slide4.xml><?xml version="1.0" encoding="utf-8"?>
+<p:sld xmlns:a="http://schemas.openxmlformats.org/drawingml/2006/main" xmlns:r="http://schemas.openxmlformats.org/officeDocument/2006/relationships" xmlns:p="http://schemas.openxmlformats.org/presentationml/2006/main">
+  <p:cSld>
+    <p:spTree>
+      <p:nvGrpSpPr>
+        <p:cNvPr id="1" name=""/>
+        <p:cNvGrpSpPr/>
+        <p:nvPr/>
+      </p:nvGrpSpPr>
+      <p:grpSpPr>
+        <a:xfrm>
+          <a:off x="0" y="0"/>
+          <a:ext cx="0" cy="0"/>
+          <a:chOff x="0" y="0"/>
+          <a:chExt cx="0" cy="0"/>
+        </a:xfrm>
+      </p:grpSpPr>
+      <p:sp>
+        <p:nvSpPr>
+          <p:cNvPr id="33" name="TextBox 32"/>
+          <p:cNvSpPr txBox="1"/>
+          <p:nvPr/>
+        </p:nvSpPr>
+        <p:spPr>
+          <a:xfrm>
+            <a:off x="5084" y="1447800"/>
+            <a:ext cx="3119116" cy="215444"/>
+          </a:xfrm>
+          <a:prstGeom prst="rect">
+            <a:avLst/>
+          </a:prstGeom>
+          <a:noFill/>
+        </p:spPr>
+        <p:txBody>
+          <a:bodyPr wrap="square" lIns="0" tIns="0" rIns="0" bIns="0" rtlCol="0">
+            <a:spAutoFit/>
+          </a:bodyPr>
+          <a:lstStyle/>
+          <a:p>
+            <a:r>
+              <a:rPr lang="en-US" sz="1400" dirty="0" smtClean="0">
+                <a:solidFill>
+                  <a:srgbClr val="660066"/>
+                </a:solidFill>
+              </a:rPr>
+              <a:t>raise( </a:t>
+            </a:r>
+            <a:r>
+              <a:rPr lang="en-US" sz="1400" dirty="0" err="1" smtClean="0">
+                <a:solidFill>
+                  <a:srgbClr val="660066"/>
+                </a:solidFill>
+              </a:rPr>
+              <a:t>PersonPanelSelection</a:t>
+            </a:r>
+            <a:r>
+              <a:rPr lang="en-US" sz="1400" dirty="0" err="1" smtClean="0">
+                <a:solidFill>
+                  <a:srgbClr val="660066"/>
+                </a:solidFill>
+              </a:rPr>
+              <a:t>ChangedEven</a:t>
+            </a:r>
+            <a:r>
+              <a:rPr lang="en-US" sz="1400" dirty="0" err="1" smtClean="0">
+                <a:solidFill>
+                  <a:srgbClr val="660066"/>
+                </a:solidFill>
+              </a:rPr>
+              <a:t>t</a:t>
+            </a:r>
+            <a:r>
+              <a:rPr lang="en-US" sz="1400" dirty="0" smtClean="0">
+                <a:solidFill>
+                  <a:srgbClr val="660066"/>
+                </a:solidFill>
+              </a:rPr>
+              <a:t>)</a:t>
+            </a:r>
+            <a:endParaRPr lang="en-US" sz="1400" dirty="0">
+              <a:solidFill>
+                <a:srgbClr val="660066"/>
+              </a:solidFill>
+            </a:endParaRPr>
+          </a:p>
+        </p:txBody>
+      </p:sp>
+      <p:sp>
+        <p:nvSpPr>
+          <p:cNvPr id="39" name="Rectangle 62"/>
+          <p:cNvSpPr/>
+          <p:nvPr/>
+        </p:nvSpPr>
+        <p:spPr>
+          <a:xfrm>
+            <a:off x="3733800" y="990600"/>
+            <a:ext cx="1371600" cy="346760"/>
+          </a:xfrm>
+          <a:prstGeom prst="rect">
+            <a:avLst/>
+          </a:prstGeom>
+          <a:solidFill>
+            <a:schemeClr val="accent5">
+              <a:lumMod val="75000"/>
+            </a:schemeClr>
+          </a:solidFill>
+          <a:ln w="19050">
+            <a:solidFill>
+              <a:schemeClr val="accent5">
+                <a:lumMod val="75000"/>
+              </a:schemeClr>
+            </a:solidFill>
+          </a:ln>
+          <a:effectLst/>
+        </p:spPr>
+        <p:style>
+          <a:lnRef idx="1">
+            <a:schemeClr val="accent2"/>
+          </a:lnRef>
+          <a:fillRef idx="2">
+            <a:schemeClr val="accent2"/>
+          </a:fillRef>
+          <a:effectRef idx="1">
+            <a:schemeClr val="accent2"/>
+          </a:effectRef>
+          <a:fontRef idx="minor">
+            <a:schemeClr val="dk1"/>
+          </a:fontRef>
+        </p:style>
+        <p:txBody>
+          <a:bodyPr rtlCol="0" anchor="ctr"/>
+          <a:lstStyle/>
+          <a:p>
+            <a:pPr algn="ctr"/>
+            <a:r>
+              <a:rPr lang="en-US" sz="1600" dirty="0" smtClean="0">
+                <a:solidFill>
+                  <a:schemeClr val="bg1"/>
+                </a:solidFill>
+              </a:rPr>
+              <a:t>:</a:t>
+            </a:r>
+            <a:r>
+              <a:rPr lang="en-US" sz="1600" dirty="0" err="1" smtClean="0">
+                <a:solidFill>
+                  <a:schemeClr val="bg1"/>
+                </a:solidFill>
+              </a:rPr>
+              <a:t>EventsCenter</a:t>
+            </a:r>
+            <a:endParaRPr lang="en-SG" sz="1600" dirty="0">
+              <a:solidFill>
+                <a:schemeClr val="bg1"/>
+              </a:solidFill>
+            </a:endParaRPr>
+          </a:p>
+        </p:txBody>
+      </p:sp>
+      <p:cxnSp>
+        <p:nvCxnSpPr>
+          <p:cNvPr id="40" name="Straight Connector 39"/>
+          <p:cNvCxnSpPr/>
+          <p:nvPr/>
+        </p:nvCxnSpPr>
+        <p:spPr>
+          <a:xfrm>
+            <a:off x="4495800" y="1295400"/>
+            <a:ext cx="0" cy="2590800"/>
+          </a:xfrm>
+          <a:prstGeom prst="line">
+            <a:avLst/>
+          </a:prstGeom>
+          <a:ln w="19050">
+            <a:solidFill>
+              <a:schemeClr val="accent5">
+                <a:lumMod val="75000"/>
+              </a:schemeClr>
+            </a:solidFill>
+            <a:prstDash val="sysDash"/>
+          </a:ln>
+          <a:effectLst/>
+        </p:spPr>
+        <p:style>
+          <a:lnRef idx="1">
+            <a:schemeClr val="accent1"/>
+          </a:lnRef>
+          <a:fillRef idx="2">
+            <a:schemeClr val="accent1"/>
+          </a:fillRef>
+          <a:effectRef idx="1">
+            <a:schemeClr val="accent1"/>
+          </a:effectRef>
+          <a:fontRef idx="minor">
+            <a:schemeClr val="dk1"/>
+          </a:fontRef>
+        </p:style>
+      </p:cxnSp>
+      <p:sp>
+        <p:nvSpPr>
+          <p:cNvPr id="41" name="Rectangle 40"/>
+          <p:cNvSpPr/>
+          <p:nvPr/>
+        </p:nvSpPr>
+        <p:spPr>
+          <a:xfrm>
+            <a:off x="2667000" y="1752600"/>
+            <a:ext cx="152400" cy="1143000"/>
+          </a:xfrm>
+          <a:prstGeom prst="rect">
+            <a:avLst/>
+          </a:prstGeom>
+          <a:solidFill>
+            <a:schemeClr val="accent3">
+              <a:lumMod val="40000"/>
+              <a:lumOff val="60000"/>
+            </a:schemeClr>
+          </a:solidFill>
+          <a:ln>
+            <a:solidFill>
+              <a:schemeClr val="accent5">
+                <a:lumMod val="75000"/>
+              </a:schemeClr>
+            </a:solidFill>
+          </a:ln>
+          <a:effectLst/>
+        </p:spPr>
+        <p:style>
+          <a:lnRef idx="1">
+            <a:schemeClr val="accent3"/>
+          </a:lnRef>
+          <a:fillRef idx="2">
+            <a:schemeClr val="accent3"/>
+          </a:fillRef>
+          <a:effectRef idx="1">
+            <a:schemeClr val="accent3"/>
+          </a:effectRef>
+          <a:fontRef idx="minor">
+            <a:schemeClr val="dk1"/>
+          </a:fontRef>
+        </p:style>
+        <p:txBody>
+          <a:bodyPr rtlCol="0" anchor="ctr"/>
+          <a:lstStyle/>
+          <a:p>
+            <a:pPr algn="ctr"/>
+            <a:endParaRPr lang="en-SG" sz="1400">
+              <a:solidFill>
+                <a:srgbClr val="77933C"/>
+              </a:solidFill>
+            </a:endParaRPr>
+          </a:p>
+        </p:txBody>
+      </p:sp>
+      <p:sp>
+        <p:nvSpPr>
+          <p:cNvPr id="27" name="Rectangle 62"/>
+          <p:cNvSpPr/>
+          <p:nvPr/>
+        </p:nvSpPr>
+        <p:spPr>
+          <a:xfrm>
+            <a:off x="2286000" y="990600"/>
+            <a:ext cx="914400" cy="304800"/>
+          </a:xfrm>
+          <a:prstGeom prst="rect">
+            <a:avLst/>
+          </a:prstGeom>
+          <a:ln w="6350">
+            <a:solidFill>
+              <a:schemeClr val="accent3"/>
+            </a:solidFill>
+          </a:ln>
+          <a:effectLst/>
+        </p:spPr>
+        <p:style>
+          <a:lnRef idx="1">
+            <a:schemeClr val="accent3"/>
+          </a:lnRef>
+          <a:fillRef idx="2">
+            <a:schemeClr val="accent3"/>
+          </a:fillRef>
+          <a:effectRef idx="1">
+            <a:schemeClr val="accent3"/>
+          </a:effectRef>
+          <a:fontRef idx="minor">
+            <a:schemeClr val="dk1"/>
+          </a:fontRef>
+        </p:style>
+        <p:txBody>
+          <a:bodyPr rtlCol="0" anchor="ctr"/>
+          <a:lstStyle/>
+          <a:p>
+            <a:pPr algn="ctr"/>
+            <a:r>
+              <a:rPr lang="en-US" sz="1600" b="1" dirty="0">
+                <a:solidFill>
+                  <a:schemeClr val="accent3">
+                    <a:lumMod val="75000"/>
+                  </a:schemeClr>
+                </a:solidFill>
+              </a:rPr>
+              <a:t>:</a:t>
+            </a:r>
+            <a:r>
+              <a:rPr lang="en-US" sz="1600" b="1" dirty="0" err="1" smtClean="0">
+                <a:solidFill>
+                  <a:schemeClr val="accent3">
+                    <a:lumMod val="75000"/>
+                  </a:schemeClr>
+                </a:solidFill>
+              </a:rPr>
+              <a:t>UiPart</a:t>
+            </a:r>
+            <a:endParaRPr lang="en-SG" sz="1600" b="1" dirty="0">
+              <a:solidFill>
+                <a:schemeClr val="accent3">
+                  <a:lumMod val="75000"/>
+                </a:schemeClr>
+              </a:solidFill>
+            </a:endParaRPr>
+          </a:p>
+        </p:txBody>
+      </p:sp>
+      <p:cxnSp>
+        <p:nvCxnSpPr>
+          <p:cNvPr id="34" name="Straight Arrow Connector 33"/>
+          <p:cNvCxnSpPr/>
+          <p:nvPr/>
+        </p:nvCxnSpPr>
+        <p:spPr>
+          <a:xfrm>
+            <a:off x="228600" y="1752600"/>
+            <a:ext cx="2438400" cy="12194"/>
+          </a:xfrm>
+          <a:prstGeom prst="straightConnector1">
+            <a:avLst/>
+          </a:prstGeom>
+          <a:ln w="19050">
+            <a:solidFill>
+              <a:srgbClr val="660066"/>
+            </a:solidFill>
+            <a:tailEnd type="arrow"/>
+          </a:ln>
+        </p:spPr>
+        <p:style>
+          <a:lnRef idx="1">
+            <a:schemeClr val="accent1"/>
+          </a:lnRef>
+          <a:fillRef idx="0">
+            <a:schemeClr val="accent1"/>
+          </a:fillRef>
+          <a:effectRef idx="0">
+            <a:schemeClr val="accent1"/>
+          </a:effectRef>
+          <a:fontRef idx="minor">
+            <a:schemeClr val="tx1"/>
+          </a:fontRef>
+        </p:style>
+      </p:cxnSp>
+      <p:cxnSp>
+        <p:nvCxnSpPr>
+          <p:cNvPr id="38" name="Straight Connector 37"/>
+          <p:cNvCxnSpPr>
+            <a:stCxn id="27" idx="2"/>
+          </p:cNvCxnSpPr>
+          <p:nvPr/>
+        </p:nvCxnSpPr>
+        <p:spPr>
+          <a:xfrm>
+            <a:off x="2743200" y="1295400"/>
+            <a:ext cx="0" cy="2590800"/>
+          </a:xfrm>
+          <a:prstGeom prst="line">
+            <a:avLst/>
+          </a:prstGeom>
+          <a:ln w="19050">
+            <a:solidFill>
+              <a:srgbClr val="77933C"/>
+            </a:solidFill>
+            <a:prstDash val="sysDash"/>
+          </a:ln>
+          <a:effectLst/>
+        </p:spPr>
+        <p:style>
+          <a:lnRef idx="1">
+            <a:schemeClr val="accent1"/>
+          </a:lnRef>
+          <a:fillRef idx="2">
+            <a:schemeClr val="accent1"/>
+          </a:fillRef>
+          <a:effectRef idx="1">
+            <a:schemeClr val="accent1"/>
+          </a:effectRef>
+          <a:fontRef idx="minor">
+            <a:schemeClr val="dk1"/>
+          </a:fontRef>
+        </p:style>
+      </p:cxnSp>
+      <p:sp>
+        <p:nvSpPr>
+          <p:cNvPr id="43" name="Rectangle 42"/>
+          <p:cNvSpPr/>
+          <p:nvPr/>
+        </p:nvSpPr>
+        <p:spPr>
+          <a:xfrm>
+            <a:off x="4419600" y="1981200"/>
+            <a:ext cx="152400" cy="685800"/>
+          </a:xfrm>
+          <a:prstGeom prst="rect">
+            <a:avLst/>
+          </a:prstGeom>
+          <a:solidFill>
+            <a:schemeClr val="accent5">
+              <a:lumMod val="75000"/>
+            </a:schemeClr>
+          </a:solidFill>
+          <a:ln>
+            <a:solidFill>
+              <a:schemeClr val="accent5">
+                <a:lumMod val="75000"/>
+              </a:schemeClr>
+            </a:solidFill>
+          </a:ln>
+          <a:effectLst/>
+        </p:spPr>
+        <p:style>
+          <a:lnRef idx="1">
+            <a:schemeClr val="accent3"/>
+          </a:lnRef>
+          <a:fillRef idx="2">
+            <a:schemeClr val="accent3"/>
+          </a:fillRef>
+          <a:effectRef idx="1">
+            <a:schemeClr val="accent3"/>
+          </a:effectRef>
+          <a:fontRef idx="minor">
+            <a:schemeClr val="dk1"/>
+          </a:fontRef>
+        </p:style>
+        <p:txBody>
+          <a:bodyPr rtlCol="0" anchor="ctr"/>
+          <a:lstStyle/>
+          <a:p>
+            <a:pPr algn="ctr"/>
+            <a:endParaRPr lang="en-SG" sz="1400">
+              <a:solidFill>
+                <a:srgbClr val="77933C"/>
+              </a:solidFill>
+            </a:endParaRPr>
+          </a:p>
+        </p:txBody>
+      </p:sp>
+      <p:sp>
+        <p:nvSpPr>
+          <p:cNvPr id="45" name="TextBox 44"/>
+          <p:cNvSpPr txBox="1"/>
+          <p:nvPr/>
+        </p:nvSpPr>
+        <p:spPr>
+          <a:xfrm>
+            <a:off x="2819400" y="1676400"/>
+            <a:ext cx="3119116" cy="215444"/>
+          </a:xfrm>
+          <a:prstGeom prst="rect">
+            <a:avLst/>
+          </a:prstGeom>
+          <a:noFill/>
+        </p:spPr>
+        <p:txBody>
+          <a:bodyPr wrap="square" lIns="0" tIns="0" rIns="0" bIns="0" rtlCol="0">
+            <a:spAutoFit/>
+          </a:bodyPr>
+          <a:lstStyle/>
+          <a:p>
+            <a:r>
+              <a:rPr lang="en-US" sz="1400" dirty="0" smtClean="0">
+                <a:solidFill>
+                  <a:srgbClr val="31859C"/>
+                </a:solidFill>
+              </a:rPr>
+              <a:t>post</a:t>
+            </a:r>
+            <a:r>
+              <a:rPr lang="en-US" sz="1400" dirty="0" smtClean="0">
+                <a:solidFill>
+                  <a:srgbClr val="31859C"/>
+                </a:solidFill>
+              </a:rPr>
+              <a:t>( </a:t>
+            </a:r>
+            <a:r>
+              <a:rPr lang="en-US" sz="1400" dirty="0" err="1" smtClean="0">
+                <a:solidFill>
+                  <a:srgbClr val="31859C"/>
+                </a:solidFill>
+              </a:rPr>
+              <a:t>PersonPanelSelection</a:t>
+            </a:r>
+            <a:r>
+              <a:rPr lang="en-US" sz="1400" dirty="0" err="1" smtClean="0">
+                <a:solidFill>
+                  <a:srgbClr val="31859C"/>
+                </a:solidFill>
+              </a:rPr>
+              <a:t>ChangedEven</a:t>
+            </a:r>
+            <a:r>
+              <a:rPr lang="en-US" sz="1400" dirty="0" err="1" smtClean="0">
+                <a:solidFill>
+                  <a:srgbClr val="31859C"/>
+                </a:solidFill>
+              </a:rPr>
+              <a:t>t</a:t>
+            </a:r>
+            <a:r>
+              <a:rPr lang="en-US" sz="1400" dirty="0" smtClean="0">
+                <a:solidFill>
+                  <a:srgbClr val="31859C"/>
+                </a:solidFill>
+              </a:rPr>
+              <a:t>)</a:t>
+            </a:r>
+            <a:endParaRPr lang="en-US" sz="1400" dirty="0">
+              <a:solidFill>
+                <a:srgbClr val="31859C"/>
+              </a:solidFill>
+            </a:endParaRPr>
+          </a:p>
+        </p:txBody>
+      </p:sp>
+      <p:cxnSp>
+        <p:nvCxnSpPr>
+          <p:cNvPr id="48" name="Straight Arrow Connector 47"/>
+          <p:cNvCxnSpPr>
+            <a:endCxn id="58" idx="0"/>
+          </p:cNvCxnSpPr>
+          <p:nvPr/>
+        </p:nvCxnSpPr>
+        <p:spPr>
+          <a:xfrm>
+            <a:off x="4572000" y="2133600"/>
+            <a:ext cx="2514600" cy="0"/>
+          </a:xfrm>
+          <a:prstGeom prst="straightConnector1">
+            <a:avLst/>
+          </a:prstGeom>
+          <a:ln>
+            <a:solidFill>
+              <a:schemeClr val="accent5">
+                <a:lumMod val="75000"/>
+              </a:schemeClr>
+            </a:solidFill>
+            <a:tailEnd type="arrow"/>
+          </a:ln>
+        </p:spPr>
+        <p:style>
+          <a:lnRef idx="1">
+            <a:schemeClr val="accent5"/>
+          </a:lnRef>
+          <a:fillRef idx="0">
+            <a:schemeClr val="accent5"/>
+          </a:fillRef>
+          <a:effectRef idx="0">
+            <a:schemeClr val="accent5"/>
+          </a:effectRef>
+          <a:fontRef idx="minor">
+            <a:schemeClr val="tx1"/>
+          </a:fontRef>
+        </p:style>
+      </p:cxnSp>
+      <p:cxnSp>
+        <p:nvCxnSpPr>
+          <p:cNvPr id="53" name="Straight Arrow Connector 52"/>
+          <p:cNvCxnSpPr>
+            <a:endCxn id="43" idx="0"/>
+          </p:cNvCxnSpPr>
+          <p:nvPr/>
+        </p:nvCxnSpPr>
+        <p:spPr>
+          <a:xfrm>
+            <a:off x="2819400" y="1981200"/>
+            <a:ext cx="1676400" cy="0"/>
+          </a:xfrm>
+          <a:prstGeom prst="straightConnector1">
+            <a:avLst/>
+          </a:prstGeom>
+          <a:ln>
+            <a:solidFill>
+              <a:schemeClr val="accent5">
+                <a:lumMod val="75000"/>
+              </a:schemeClr>
+            </a:solidFill>
+            <a:tailEnd type="arrow"/>
+          </a:ln>
+        </p:spPr>
+        <p:style>
+          <a:lnRef idx="1">
+            <a:schemeClr val="accent5"/>
+          </a:lnRef>
+          <a:fillRef idx="0">
+            <a:schemeClr val="accent5"/>
+          </a:fillRef>
+          <a:effectRef idx="0">
+            <a:schemeClr val="accent5"/>
+          </a:effectRef>
+          <a:fontRef idx="minor">
+            <a:schemeClr val="tx1"/>
+          </a:fontRef>
+        </p:style>
+      </p:cxnSp>
+      <p:sp>
+        <p:nvSpPr>
+          <p:cNvPr id="55" name="TextBox 54"/>
+          <p:cNvSpPr txBox="1"/>
+          <p:nvPr/>
+        </p:nvSpPr>
+        <p:spPr>
+          <a:xfrm>
+            <a:off x="4572000" y="1905000"/>
+            <a:ext cx="3119116" cy="215444"/>
+          </a:xfrm>
+          <a:prstGeom prst="rect">
+            <a:avLst/>
+          </a:prstGeom>
+          <a:noFill/>
+        </p:spPr>
+        <p:txBody>
+          <a:bodyPr wrap="square" lIns="0" tIns="0" rIns="0" bIns="0" rtlCol="0">
+            <a:spAutoFit/>
+          </a:bodyPr>
+          <a:lstStyle/>
+          <a:p>
+            <a:r>
+              <a:rPr lang="en-US" sz="1400" dirty="0" err="1" smtClean="0">
+                <a:solidFill>
+                  <a:srgbClr val="31859C"/>
+                </a:solidFill>
+              </a:rPr>
+              <a:t>handle</a:t>
+            </a:r>
+            <a:r>
+              <a:rPr lang="en-US" sz="1400" dirty="0" err="1" smtClean="0">
+                <a:solidFill>
+                  <a:srgbClr val="31859C"/>
+                </a:solidFill>
+              </a:rPr>
+              <a:t>Selection</a:t>
+            </a:r>
+            <a:r>
+              <a:rPr lang="en-US" sz="1400" dirty="0" err="1" smtClean="0">
+                <a:solidFill>
+                  <a:srgbClr val="31859C"/>
+                </a:solidFill>
+              </a:rPr>
+              <a:t>ChangedEven</a:t>
+            </a:r>
+            <a:r>
+              <a:rPr lang="en-US" sz="1400" dirty="0" err="1" smtClean="0">
+                <a:solidFill>
+                  <a:srgbClr val="31859C"/>
+                </a:solidFill>
+              </a:rPr>
+              <a:t>t</a:t>
+            </a:r>
+            <a:r>
+              <a:rPr lang="en-US" sz="1400" dirty="0" smtClean="0">
+                <a:solidFill>
+                  <a:srgbClr val="31859C"/>
+                </a:solidFill>
+              </a:rPr>
+              <a:t>()</a:t>
+            </a:r>
+            <a:endParaRPr lang="en-US" sz="1400" dirty="0">
+              <a:solidFill>
+                <a:srgbClr val="31859C"/>
+              </a:solidFill>
+            </a:endParaRPr>
+          </a:p>
+        </p:txBody>
+      </p:sp>
+      <p:sp>
+        <p:nvSpPr>
+          <p:cNvPr id="56" name="Rectangle 62"/>
+          <p:cNvSpPr/>
+          <p:nvPr/>
+        </p:nvSpPr>
+        <p:spPr>
+          <a:xfrm>
+            <a:off x="6324600" y="990600"/>
+            <a:ext cx="1447800" cy="381000"/>
+          </a:xfrm>
+          <a:prstGeom prst="rect">
+            <a:avLst/>
+          </a:prstGeom>
+          <a:ln w="6350">
+            <a:solidFill>
+              <a:schemeClr val="accent3"/>
+            </a:solidFill>
+          </a:ln>
+          <a:effectLst/>
+        </p:spPr>
+        <p:style>
+          <a:lnRef idx="1">
+            <a:schemeClr val="accent3"/>
+          </a:lnRef>
+          <a:fillRef idx="2">
+            <a:schemeClr val="accent3"/>
+          </a:fillRef>
+          <a:effectRef idx="1">
+            <a:schemeClr val="accent3"/>
+          </a:effectRef>
+          <a:fontRef idx="minor">
+            <a:schemeClr val="dk1"/>
+          </a:fontRef>
+        </p:style>
+        <p:txBody>
+          <a:bodyPr rtlCol="0" anchor="ctr"/>
+          <a:lstStyle/>
+          <a:p>
+            <a:pPr algn="ctr"/>
+            <a:r>
+              <a:rPr lang="en-US" sz="1600" b="1" dirty="0" smtClean="0">
+                <a:solidFill>
+                  <a:schemeClr val="accent3">
+                    <a:lumMod val="75000"/>
+                  </a:schemeClr>
+                </a:solidFill>
+              </a:rPr>
+              <a:t>:</a:t>
+            </a:r>
+            <a:r>
+              <a:rPr lang="en-US" sz="1600" b="1" dirty="0" err="1" smtClean="0">
+                <a:solidFill>
+                  <a:schemeClr val="accent3">
+                    <a:lumMod val="75000"/>
+                  </a:schemeClr>
+                </a:solidFill>
+              </a:rPr>
+              <a:t>BrowserPanel</a:t>
+            </a:r>
+            <a:endParaRPr lang="en-SG" sz="1600" b="1" dirty="0">
+              <a:solidFill>
+                <a:schemeClr val="accent3">
+                  <a:lumMod val="75000"/>
+                </a:schemeClr>
+              </a:solidFill>
+            </a:endParaRPr>
+          </a:p>
+        </p:txBody>
+      </p:sp>
+      <p:sp>
+        <p:nvSpPr>
+          <p:cNvPr id="58" name="Rectangle 57"/>
+          <p:cNvSpPr/>
+          <p:nvPr/>
+        </p:nvSpPr>
+        <p:spPr>
+          <a:xfrm>
+            <a:off x="7010400" y="2133600"/>
+            <a:ext cx="152400" cy="381000"/>
+          </a:xfrm>
+          <a:prstGeom prst="rect">
+            <a:avLst/>
+          </a:prstGeom>
+          <a:solidFill>
+            <a:schemeClr val="accent3">
+              <a:lumMod val="40000"/>
+              <a:lumOff val="60000"/>
+            </a:schemeClr>
+          </a:solidFill>
+          <a:ln>
+            <a:solidFill>
+              <a:schemeClr val="accent5">
+                <a:lumMod val="75000"/>
+              </a:schemeClr>
+            </a:solidFill>
+          </a:ln>
+          <a:effectLst/>
+        </p:spPr>
+        <p:style>
+          <a:lnRef idx="1">
+            <a:schemeClr val="accent3"/>
+          </a:lnRef>
+          <a:fillRef idx="2">
+            <a:schemeClr val="accent3"/>
+          </a:fillRef>
+          <a:effectRef idx="1">
+            <a:schemeClr val="accent3"/>
+          </a:effectRef>
+          <a:fontRef idx="minor">
+            <a:schemeClr val="dk1"/>
+          </a:fontRef>
+        </p:style>
+        <p:txBody>
+          <a:bodyPr rtlCol="0" anchor="ctr"/>
+          <a:lstStyle/>
+          <a:p>
+            <a:pPr algn="ctr"/>
+            <a:endParaRPr lang="en-SG" sz="1400">
+              <a:solidFill>
+                <a:srgbClr val="77933C"/>
+              </a:solidFill>
+            </a:endParaRPr>
+          </a:p>
+        </p:txBody>
+      </p:sp>
+      <p:sp>
+        <p:nvSpPr>
+          <p:cNvPr id="64" name="Rectangle 63"/>
+          <p:cNvSpPr/>
+          <p:nvPr/>
+        </p:nvSpPr>
+        <p:spPr>
+          <a:xfrm flipH="1">
+            <a:off x="7086600" y="2209800"/>
+            <a:ext cx="152400" cy="228600"/>
+          </a:xfrm>
+          <a:prstGeom prst="rect">
+            <a:avLst/>
+          </a:prstGeom>
+          <a:solidFill>
+            <a:schemeClr val="accent3">
+              <a:lumMod val="40000"/>
+              <a:lumOff val="60000"/>
+            </a:schemeClr>
+          </a:solidFill>
+          <a:ln>
+            <a:solidFill>
+              <a:schemeClr val="accent5">
+                <a:lumMod val="75000"/>
+              </a:schemeClr>
+            </a:solidFill>
+          </a:ln>
+          <a:effectLst/>
+        </p:spPr>
+        <p:style>
+          <a:lnRef idx="1">
+            <a:schemeClr val="accent3"/>
+          </a:lnRef>
+          <a:fillRef idx="2">
+            <a:schemeClr val="accent3"/>
+          </a:fillRef>
+          <a:effectRef idx="1">
+            <a:schemeClr val="accent3"/>
+          </a:effectRef>
+          <a:fontRef idx="minor">
+            <a:schemeClr val="dk1"/>
+          </a:fontRef>
+        </p:style>
+        <p:txBody>
+          <a:bodyPr rtlCol="0" anchor="ctr"/>
+          <a:lstStyle/>
+          <a:p>
+            <a:pPr algn="ctr"/>
+            <a:endParaRPr lang="en-SG" sz="1400">
+              <a:solidFill>
+                <a:srgbClr val="77933C"/>
+              </a:solidFill>
+            </a:endParaRPr>
+          </a:p>
+        </p:txBody>
+      </p:sp>
+      <p:cxnSp>
+        <p:nvCxnSpPr>
+          <p:cNvPr id="67" name="Curved Connector 66"/>
+          <p:cNvCxnSpPr>
+            <a:endCxn id="64" idx="1"/>
+          </p:cNvCxnSpPr>
+          <p:nvPr/>
+        </p:nvCxnSpPr>
+        <p:spPr>
+          <a:xfrm rot="16200000" flipH="1">
+            <a:off x="7105650" y="2190750"/>
+            <a:ext cx="190500" cy="76200"/>
+          </a:xfrm>
+          <a:prstGeom prst="curvedConnector4">
+            <a:avLst>
+              <a:gd name="adj1" fmla="val 20000"/>
+              <a:gd name="adj2" fmla="val 400000"/>
+            </a:avLst>
+          </a:prstGeom>
+          <a:ln>
+            <a:solidFill>
+              <a:schemeClr val="accent3">
+                <a:lumMod val="75000"/>
+              </a:schemeClr>
+            </a:solidFill>
+            <a:tailEnd type="arrow"/>
+          </a:ln>
+        </p:spPr>
+        <p:style>
+          <a:lnRef idx="2">
+            <a:schemeClr val="accent1"/>
+          </a:lnRef>
+          <a:fillRef idx="0">
+            <a:schemeClr val="accent1"/>
+          </a:fillRef>
+          <a:effectRef idx="1">
+            <a:schemeClr val="accent1"/>
+          </a:effectRef>
+          <a:fontRef idx="minor">
+            <a:schemeClr val="tx1"/>
+          </a:fontRef>
+        </p:style>
+      </p:cxnSp>
+      <p:sp>
+        <p:nvSpPr>
+          <p:cNvPr id="77" name="TextBox 76"/>
+          <p:cNvSpPr txBox="1"/>
+          <p:nvPr/>
+        </p:nvSpPr>
+        <p:spPr>
+          <a:xfrm>
+            <a:off x="7162800" y="1981200"/>
+            <a:ext cx="1295400" cy="215444"/>
+          </a:xfrm>
+          <a:prstGeom prst="rect">
+            <a:avLst/>
+          </a:prstGeom>
+          <a:noFill/>
+        </p:spPr>
+        <p:txBody>
+          <a:bodyPr wrap="square" lIns="0" tIns="0" rIns="0" bIns="0" rtlCol="0">
+            <a:spAutoFit/>
+          </a:bodyPr>
+          <a:lstStyle/>
+          <a:p>
+            <a:r>
+              <a:rPr lang="en-US" sz="1400" dirty="0" err="1" smtClean="0">
+                <a:solidFill>
+                  <a:schemeClr val="accent3">
+                    <a:lumMod val="75000"/>
+                  </a:schemeClr>
+                </a:solidFill>
+              </a:rPr>
+              <a:t>loadPersonPage</a:t>
+            </a:r>
+            <a:r>
+              <a:rPr lang="en-US" sz="1400" dirty="0" smtClean="0">
+                <a:solidFill>
+                  <a:schemeClr val="accent3">
+                    <a:lumMod val="75000"/>
+                  </a:schemeClr>
+                </a:solidFill>
+              </a:rPr>
+              <a:t>()</a:t>
+            </a:r>
+            <a:endParaRPr lang="en-US" sz="1400" dirty="0">
+              <a:solidFill>
+                <a:schemeClr val="accent3">
+                  <a:lumMod val="75000"/>
+                </a:schemeClr>
+              </a:solidFill>
+            </a:endParaRPr>
+          </a:p>
+        </p:txBody>
+      </p:sp>
+      <p:cxnSp>
+        <p:nvCxnSpPr>
+          <p:cNvPr id="78" name="Straight Arrow Connector 77"/>
+          <p:cNvCxnSpPr/>
+          <p:nvPr/>
+        </p:nvCxnSpPr>
+        <p:spPr>
+          <a:xfrm>
+            <a:off x="4572000" y="2514600"/>
+            <a:ext cx="2439118" cy="0"/>
+          </a:xfrm>
+          <a:prstGeom prst="straightConnector1">
+            <a:avLst/>
+          </a:prstGeom>
+          <a:ln w="19050">
+            <a:solidFill>
+              <a:schemeClr val="accent3">
+                <a:lumMod val="75000"/>
+              </a:schemeClr>
+            </a:solidFill>
+            <a:prstDash val="sysDash"/>
+            <a:headEnd type="arrow" w="med" len="med"/>
+            <a:tailEnd type="none" w="med" len="med"/>
+          </a:ln>
+        </p:spPr>
+        <p:style>
+          <a:lnRef idx="1">
+            <a:schemeClr val="accent1"/>
+          </a:lnRef>
+          <a:fillRef idx="0">
+            <a:schemeClr val="accent1"/>
+          </a:fillRef>
+          <a:effectRef idx="0">
+            <a:schemeClr val="accent1"/>
+          </a:effectRef>
+          <a:fontRef idx="minor">
+            <a:schemeClr val="tx1"/>
+          </a:fontRef>
+        </p:style>
+      </p:cxnSp>
+      <p:cxnSp>
+        <p:nvCxnSpPr>
+          <p:cNvPr id="80" name="Straight Arrow Connector 79"/>
+          <p:cNvCxnSpPr/>
+          <p:nvPr/>
+        </p:nvCxnSpPr>
+        <p:spPr>
+          <a:xfrm>
+            <a:off x="2819400" y="2667000"/>
+            <a:ext cx="1600918" cy="0"/>
+          </a:xfrm>
+          <a:prstGeom prst="straightConnector1">
+            <a:avLst/>
+          </a:prstGeom>
+          <a:ln w="19050">
+            <a:solidFill>
+              <a:schemeClr val="accent5">
+                <a:lumMod val="75000"/>
+              </a:schemeClr>
+            </a:solidFill>
+            <a:prstDash val="sysDash"/>
+            <a:headEnd type="arrow" w="med" len="med"/>
+            <a:tailEnd type="none" w="med" len="med"/>
+          </a:ln>
+        </p:spPr>
+        <p:style>
+          <a:lnRef idx="1">
+            <a:schemeClr val="accent1"/>
+          </a:lnRef>
+          <a:fillRef idx="0">
+            <a:schemeClr val="accent1"/>
+          </a:fillRef>
+          <a:effectRef idx="0">
+            <a:schemeClr val="accent1"/>
+          </a:effectRef>
+          <a:fontRef idx="minor">
+            <a:schemeClr val="tx1"/>
+          </a:fontRef>
+        </p:style>
+      </p:cxnSp>
+      <p:cxnSp>
+        <p:nvCxnSpPr>
+          <p:cNvPr id="83" name="Straight Arrow Connector 82"/>
+          <p:cNvCxnSpPr/>
+          <p:nvPr/>
+        </p:nvCxnSpPr>
+        <p:spPr>
+          <a:xfrm>
+            <a:off x="609600" y="2895600"/>
+            <a:ext cx="2058118" cy="0"/>
+          </a:xfrm>
+          <a:prstGeom prst="straightConnector1">
+            <a:avLst/>
+          </a:prstGeom>
+          <a:ln w="19050">
+            <a:solidFill>
+              <a:schemeClr val="accent3">
+                <a:lumMod val="75000"/>
+              </a:schemeClr>
+            </a:solidFill>
+            <a:prstDash val="sysDash"/>
+            <a:headEnd type="arrow" w="med" len="med"/>
+            <a:tailEnd type="none" w="med" len="med"/>
+          </a:ln>
+        </p:spPr>
+        <p:style>
+          <a:lnRef idx="1">
+            <a:schemeClr val="accent1"/>
+          </a:lnRef>
+          <a:fillRef idx="0">
+            <a:schemeClr val="accent1"/>
+          </a:fillRef>
+          <a:effectRef idx="0">
+            <a:schemeClr val="accent1"/>
+          </a:effectRef>
+          <a:fontRef idx="minor">
+            <a:schemeClr val="tx1"/>
+          </a:fontRef>
+        </p:style>
+      </p:cxnSp>
+      <p:cxnSp>
+        <p:nvCxnSpPr>
+          <p:cNvPr id="84" name="Straight Connector 83"/>
+          <p:cNvCxnSpPr/>
+          <p:nvPr/>
+        </p:nvCxnSpPr>
+        <p:spPr>
+          <a:xfrm>
+            <a:off x="7086600" y="1295400"/>
+            <a:ext cx="0" cy="2590800"/>
+          </a:xfrm>
+          <a:prstGeom prst="line">
+            <a:avLst/>
+          </a:prstGeom>
+          <a:ln w="19050">
+            <a:solidFill>
+              <a:srgbClr val="77933C"/>
+            </a:solidFill>
+            <a:prstDash val="sysDash"/>
+          </a:ln>
+          <a:effectLst/>
+        </p:spPr>
+        <p:style>
+          <a:lnRef idx="1">
+            <a:schemeClr val="accent1"/>
+          </a:lnRef>
+          <a:fillRef idx="2">
+            <a:schemeClr val="accent1"/>
+          </a:fillRef>
+          <a:effectRef idx="1">
+            <a:schemeClr val="accent1"/>
+          </a:effectRef>
+          <a:fontRef idx="minor">
+            <a:schemeClr val="dk1"/>
+          </a:fontRef>
+        </p:style>
+      </p:cxnSp>
+    </p:spTree>
+    <p:extLst>
+      <p:ext uri="{BB962C8B-B14F-4D97-AF65-F5344CB8AC3E}">
+        <p14:creationId xmlns:p14="http://schemas.microsoft.com/office/powerpoint/2010/main" val="2305542111"/>
+      </p:ext>
+    </p:extLst>
+  </p:cSld>
+  <p:clrMapOvr>
+    <a:masterClrMapping/>
+  </p:clrMapOvr>
+  <p:timing>
+    <p:tnLst>
+      <p:par>
+        <p:cTn xmlns:p14="http://schemas.microsoft.com/office/powerpoint/2010/main" id="1" dur="indefinite" restart="never" nodeType="tmRoot"/>
+      </p:par>
+    </p:tnLst>
+  </p:timing>
 </p:sld>
 </file>
 

</xml_diff>